<commit_message>
create png from pptx
</commit_message>
<xml_diff>
--- a/pict/2-3-0-a.pptx
+++ b/pict/2-3-0-a.pptx
@@ -289,7 +289,7 @@
             <a:fld id="{958FEE00-BB39-44DF-96B1-805EB79A90DD}" type="datetimeFigureOut">
               <a:rPr kumimoji="1" lang="ja-JP" altLang="en-US" smtClean="0"/>
               <a:pPr/>
-              <a:t>2013/8/23</a:t>
+              <a:t>2013/8/27</a:t>
             </a:fld>
             <a:endParaRPr kumimoji="1" lang="ja-JP" altLang="en-US"/>
           </a:p>
@@ -488,7 +488,7 @@
             <a:fld id="{958FEE00-BB39-44DF-96B1-805EB79A90DD}" type="datetimeFigureOut">
               <a:rPr kumimoji="1" lang="ja-JP" altLang="en-US" smtClean="0"/>
               <a:pPr/>
-              <a:t>2013/8/23</a:t>
+              <a:t>2013/8/27</a:t>
             </a:fld>
             <a:endParaRPr kumimoji="1" lang="ja-JP" altLang="en-US"/>
           </a:p>
@@ -697,7 +697,7 @@
             <a:fld id="{958FEE00-BB39-44DF-96B1-805EB79A90DD}" type="datetimeFigureOut">
               <a:rPr kumimoji="1" lang="ja-JP" altLang="en-US" smtClean="0"/>
               <a:pPr/>
-              <a:t>2013/8/23</a:t>
+              <a:t>2013/8/27</a:t>
             </a:fld>
             <a:endParaRPr kumimoji="1" lang="ja-JP" altLang="en-US"/>
           </a:p>
@@ -896,7 +896,7 @@
             <a:fld id="{958FEE00-BB39-44DF-96B1-805EB79A90DD}" type="datetimeFigureOut">
               <a:rPr kumimoji="1" lang="ja-JP" altLang="en-US" smtClean="0"/>
               <a:pPr/>
-              <a:t>2013/8/23</a:t>
+              <a:t>2013/8/27</a:t>
             </a:fld>
             <a:endParaRPr kumimoji="1" lang="ja-JP" altLang="en-US"/>
           </a:p>
@@ -1139,7 +1139,7 @@
             <a:fld id="{958FEE00-BB39-44DF-96B1-805EB79A90DD}" type="datetimeFigureOut">
               <a:rPr kumimoji="1" lang="ja-JP" altLang="en-US" smtClean="0"/>
               <a:pPr/>
-              <a:t>2013/8/23</a:t>
+              <a:t>2013/8/27</a:t>
             </a:fld>
             <a:endParaRPr kumimoji="1" lang="ja-JP" altLang="en-US"/>
           </a:p>
@@ -1488,7 +1488,7 @@
             <a:fld id="{958FEE00-BB39-44DF-96B1-805EB79A90DD}" type="datetimeFigureOut">
               <a:rPr kumimoji="1" lang="ja-JP" altLang="en-US" smtClean="0"/>
               <a:pPr/>
-              <a:t>2013/8/23</a:t>
+              <a:t>2013/8/27</a:t>
             </a:fld>
             <a:endParaRPr kumimoji="1" lang="ja-JP" altLang="en-US"/>
           </a:p>
@@ -1971,7 +1971,7 @@
             <a:fld id="{958FEE00-BB39-44DF-96B1-805EB79A90DD}" type="datetimeFigureOut">
               <a:rPr kumimoji="1" lang="ja-JP" altLang="en-US" smtClean="0"/>
               <a:pPr/>
-              <a:t>2013/8/23</a:t>
+              <a:t>2013/8/27</a:t>
             </a:fld>
             <a:endParaRPr kumimoji="1" lang="ja-JP" altLang="en-US"/>
           </a:p>
@@ -2086,7 +2086,7 @@
             <a:fld id="{958FEE00-BB39-44DF-96B1-805EB79A90DD}" type="datetimeFigureOut">
               <a:rPr kumimoji="1" lang="ja-JP" altLang="en-US" smtClean="0"/>
               <a:pPr/>
-              <a:t>2013/8/23</a:t>
+              <a:t>2013/8/27</a:t>
             </a:fld>
             <a:endParaRPr kumimoji="1" lang="ja-JP" altLang="en-US"/>
           </a:p>
@@ -2178,7 +2178,7 @@
             <a:fld id="{958FEE00-BB39-44DF-96B1-805EB79A90DD}" type="datetimeFigureOut">
               <a:rPr kumimoji="1" lang="ja-JP" altLang="en-US" smtClean="0"/>
               <a:pPr/>
-              <a:t>2013/8/23</a:t>
+              <a:t>2013/8/27</a:t>
             </a:fld>
             <a:endParaRPr kumimoji="1" lang="ja-JP" altLang="en-US"/>
           </a:p>
@@ -2484,7 +2484,7 @@
             <a:fld id="{958FEE00-BB39-44DF-96B1-805EB79A90DD}" type="datetimeFigureOut">
               <a:rPr kumimoji="1" lang="ja-JP" altLang="en-US" smtClean="0"/>
               <a:pPr/>
-              <a:t>2013/8/23</a:t>
+              <a:t>2013/8/27</a:t>
             </a:fld>
             <a:endParaRPr kumimoji="1" lang="ja-JP" altLang="en-US"/>
           </a:p>
@@ -2734,7 +2734,7 @@
             <a:fld id="{958FEE00-BB39-44DF-96B1-805EB79A90DD}" type="datetimeFigureOut">
               <a:rPr kumimoji="1" lang="ja-JP" altLang="en-US" smtClean="0"/>
               <a:pPr/>
-              <a:t>2013/8/23</a:t>
+              <a:t>2013/8/27</a:t>
             </a:fld>
             <a:endParaRPr kumimoji="1" lang="ja-JP" altLang="en-US"/>
           </a:p>
@@ -2976,7 +2976,7 @@
             <a:fld id="{958FEE00-BB39-44DF-96B1-805EB79A90DD}" type="datetimeFigureOut">
               <a:rPr kumimoji="1" lang="ja-JP" altLang="en-US" smtClean="0"/>
               <a:pPr/>
-              <a:t>2013/8/23</a:t>
+              <a:t>2013/8/27</a:t>
             </a:fld>
             <a:endParaRPr kumimoji="1" lang="ja-JP" altLang="en-US"/>
           </a:p>
@@ -3420,7 +3420,7 @@
         </p:nvSpPr>
         <p:spPr>
           <a:xfrm>
-            <a:off x="2681862" y="2891932"/>
+            <a:off x="3021856" y="2891932"/>
             <a:ext cx="2880320" cy="432048"/>
           </a:xfrm>
           <a:prstGeom prst="rect">
@@ -3475,7 +3475,7 @@
         </p:nvSpPr>
         <p:spPr>
           <a:xfrm>
-            <a:off x="3509810" y="1844824"/>
+            <a:off x="3849804" y="1844824"/>
             <a:ext cx="1206206" cy="563356"/>
           </a:xfrm>
           <a:prstGeom prst="can">
@@ -3529,7 +3529,7 @@
         </p:nvSpPr>
         <p:spPr>
           <a:xfrm>
-            <a:off x="2663932" y="1124744"/>
+            <a:off x="3003926" y="1124744"/>
             <a:ext cx="2880320" cy="432048"/>
           </a:xfrm>
           <a:prstGeom prst="rect">
@@ -3584,7 +3584,7 @@
         </p:nvSpPr>
         <p:spPr>
           <a:xfrm>
-            <a:off x="4013138" y="1484784"/>
+            <a:off x="4353132" y="1484784"/>
             <a:ext cx="198822" cy="216024"/>
           </a:xfrm>
           <a:prstGeom prst="rect">
@@ -3634,7 +3634,7 @@
         </p:nvCxnSpPr>
         <p:spPr>
           <a:xfrm flipH="1" flipV="1">
-            <a:off x="4112549" y="1700808"/>
+            <a:off x="4452543" y="1700808"/>
             <a:ext cx="364" cy="144016"/>
           </a:xfrm>
           <a:prstGeom prst="straightConnector1">
@@ -3669,7 +3669,7 @@
         </p:nvCxnSpPr>
         <p:spPr>
           <a:xfrm>
-            <a:off x="1583812" y="404664"/>
+            <a:off x="1923806" y="404664"/>
             <a:ext cx="5364452" cy="0"/>
           </a:xfrm>
           <a:prstGeom prst="line">
@@ -3705,7 +3705,7 @@
         </p:nvCxnSpPr>
         <p:spPr>
           <a:xfrm flipV="1">
-            <a:off x="4112549" y="404664"/>
+            <a:off x="4452543" y="404664"/>
             <a:ext cx="0" cy="504056"/>
           </a:xfrm>
           <a:prstGeom prst="straightConnector1">
@@ -3740,7 +3740,7 @@
         </p:nvSpPr>
         <p:spPr>
           <a:xfrm>
-            <a:off x="5724128" y="116632"/>
+            <a:off x="6064122" y="116632"/>
             <a:ext cx="1223412" cy="276999"/>
           </a:xfrm>
           <a:prstGeom prst="rect">
@@ -3784,7 +3784,7 @@
         </p:nvSpPr>
         <p:spPr>
           <a:xfrm>
-            <a:off x="4013138" y="908720"/>
+            <a:off x="4353132" y="908720"/>
             <a:ext cx="198822" cy="216024"/>
           </a:xfrm>
           <a:prstGeom prst="rect">
@@ -3831,7 +3831,7 @@
         </p:nvSpPr>
         <p:spPr>
           <a:xfrm>
-            <a:off x="4283968" y="620688"/>
+            <a:off x="4623962" y="620688"/>
             <a:ext cx="1260648" cy="432048"/>
           </a:xfrm>
           <a:prstGeom prst="roundRect">
@@ -3904,7 +3904,7 @@
         </p:nvCxnSpPr>
         <p:spPr>
           <a:xfrm flipV="1">
-            <a:off x="4112549" y="2408180"/>
+            <a:off x="4452543" y="2408180"/>
             <a:ext cx="364" cy="339736"/>
           </a:xfrm>
           <a:prstGeom prst="straightConnector1">
@@ -3939,7 +3939,7 @@
         </p:nvSpPr>
         <p:spPr>
           <a:xfrm>
-            <a:off x="4013138" y="2747916"/>
+            <a:off x="4353132" y="2747916"/>
             <a:ext cx="198822" cy="216024"/>
           </a:xfrm>
           <a:prstGeom prst="rect">
@@ -3986,7 +3986,7 @@
         </p:nvSpPr>
         <p:spPr>
           <a:xfrm>
-            <a:off x="2681862" y="4260084"/>
+            <a:off x="3021856" y="4260084"/>
             <a:ext cx="2880320" cy="432048"/>
           </a:xfrm>
           <a:prstGeom prst="rect">
@@ -4041,7 +4041,7 @@
         </p:nvSpPr>
         <p:spPr>
           <a:xfrm>
-            <a:off x="2681862" y="5605376"/>
+            <a:off x="3021856" y="5605376"/>
             <a:ext cx="2880320" cy="432048"/>
           </a:xfrm>
           <a:prstGeom prst="rect">
@@ -4090,13 +4090,13 @@
       </p:sp>
       <p:sp>
         <p:nvSpPr>
-          <p:cNvPr id="107" name="角丸四角形 106"/>
+          <p:cNvPr id="133" name="角丸四角形 132"/>
           <p:cNvSpPr/>
           <p:nvPr/>
         </p:nvSpPr>
         <p:spPr>
           <a:xfrm>
-            <a:off x="1331640" y="2747916"/>
+            <a:off x="1671634" y="980728"/>
             <a:ext cx="1512168" cy="432048"/>
           </a:xfrm>
           <a:prstGeom prst="roundRect">
@@ -4171,272 +4171,13 @@
       </p:sp>
       <p:sp>
         <p:nvSpPr>
-          <p:cNvPr id="108" name="角丸四角形 107"/>
-          <p:cNvSpPr/>
-          <p:nvPr/>
-        </p:nvSpPr>
-        <p:spPr>
-          <a:xfrm>
-            <a:off x="1331640" y="4116068"/>
-            <a:ext cx="1512168" cy="432048"/>
-          </a:xfrm>
-          <a:prstGeom prst="roundRect">
-            <a:avLst/>
-          </a:prstGeom>
-        </p:spPr>
-        <p:style>
-          <a:lnRef idx="2">
-            <a:schemeClr val="accent3"/>
-          </a:lnRef>
-          <a:fillRef idx="1">
-            <a:schemeClr val="lt1"/>
-          </a:fillRef>
-          <a:effectRef idx="0">
-            <a:schemeClr val="accent3"/>
-          </a:effectRef>
-          <a:fontRef idx="minor">
-            <a:schemeClr val="dk1"/>
-          </a:fontRef>
-        </p:style>
-        <p:txBody>
-          <a:bodyPr rtlCol="0" anchor="ctr"/>
-          <a:lstStyle/>
-          <a:p>
-            <a:pPr algn="ctr"/>
-            <a:r>
-              <a:rPr kumimoji="1" lang="ja-JP" altLang="en-US" sz="1000" b="1" dirty="0" smtClean="0">
-                <a:solidFill>
-                  <a:srgbClr val="002060"/>
-                </a:solidFill>
-                <a:latin typeface="Meiryo UI" pitchFamily="50" charset="-128"/>
-                <a:ea typeface="Meiryo UI" pitchFamily="50" charset="-128"/>
-                <a:cs typeface="Meiryo UI" pitchFamily="50" charset="-128"/>
-              </a:rPr>
-              <a:t>サブネット </a:t>
-            </a:r>
-            <a:r>
-              <a:rPr lang="en-US" altLang="ja-JP" sz="1000" b="1" dirty="0" smtClean="0">
-                <a:solidFill>
-                  <a:srgbClr val="002060"/>
-                </a:solidFill>
-                <a:latin typeface="Meiryo UI" pitchFamily="50" charset="-128"/>
-                <a:ea typeface="Meiryo UI" pitchFamily="50" charset="-128"/>
-                <a:cs typeface="Meiryo UI" pitchFamily="50" charset="-128"/>
-              </a:rPr>
-              <a:t>2</a:t>
-            </a:r>
-            <a:endParaRPr kumimoji="1" lang="en-US" altLang="ja-JP" sz="1000" b="1" dirty="0" smtClean="0">
-              <a:solidFill>
-                <a:srgbClr val="002060"/>
-              </a:solidFill>
-              <a:latin typeface="Meiryo UI" pitchFamily="50" charset="-128"/>
-              <a:ea typeface="Meiryo UI" pitchFamily="50" charset="-128"/>
-              <a:cs typeface="Meiryo UI" pitchFamily="50" charset="-128"/>
-            </a:endParaRPr>
-          </a:p>
-          <a:p>
-            <a:pPr algn="ctr"/>
-            <a:r>
-              <a:rPr kumimoji="1" lang="en-US" altLang="ja-JP" sz="1000" b="1" dirty="0" smtClean="0">
-                <a:solidFill>
-                  <a:srgbClr val="002060"/>
-                </a:solidFill>
-                <a:latin typeface="Meiryo UI" pitchFamily="50" charset="-128"/>
-                <a:ea typeface="Meiryo UI" pitchFamily="50" charset="-128"/>
-                <a:cs typeface="Meiryo UI" pitchFamily="50" charset="-128"/>
-              </a:rPr>
-              <a:t>(172.24.27.0/24)</a:t>
-            </a:r>
-            <a:endParaRPr kumimoji="1" lang="ja-JP" altLang="en-US" sz="1000" b="1" dirty="0">
-              <a:solidFill>
-                <a:srgbClr val="002060"/>
-              </a:solidFill>
-              <a:latin typeface="Meiryo UI" pitchFamily="50" charset="-128"/>
-              <a:ea typeface="Meiryo UI" pitchFamily="50" charset="-128"/>
-              <a:cs typeface="Meiryo UI" pitchFamily="50" charset="-128"/>
-            </a:endParaRPr>
-          </a:p>
-        </p:txBody>
-      </p:sp>
-      <p:sp>
-        <p:nvSpPr>
-          <p:cNvPr id="109" name="角丸四角形 108"/>
-          <p:cNvSpPr/>
-          <p:nvPr/>
-        </p:nvSpPr>
-        <p:spPr>
-          <a:xfrm>
-            <a:off x="1331640" y="5389352"/>
-            <a:ext cx="1512168" cy="432048"/>
-          </a:xfrm>
-          <a:prstGeom prst="roundRect">
-            <a:avLst/>
-          </a:prstGeom>
-        </p:spPr>
-        <p:style>
-          <a:lnRef idx="2">
-            <a:schemeClr val="accent3"/>
-          </a:lnRef>
-          <a:fillRef idx="1">
-            <a:schemeClr val="lt1"/>
-          </a:fillRef>
-          <a:effectRef idx="0">
-            <a:schemeClr val="accent3"/>
-          </a:effectRef>
-          <a:fontRef idx="minor">
-            <a:schemeClr val="dk1"/>
-          </a:fontRef>
-        </p:style>
-        <p:txBody>
-          <a:bodyPr rtlCol="0" anchor="ctr"/>
-          <a:lstStyle/>
-          <a:p>
-            <a:pPr algn="ctr"/>
-            <a:r>
-              <a:rPr kumimoji="1" lang="ja-JP" altLang="en-US" sz="1000" b="1" dirty="0" smtClean="0">
-                <a:solidFill>
-                  <a:srgbClr val="002060"/>
-                </a:solidFill>
-                <a:latin typeface="Meiryo UI" pitchFamily="50" charset="-128"/>
-                <a:ea typeface="Meiryo UI" pitchFamily="50" charset="-128"/>
-                <a:cs typeface="Meiryo UI" pitchFamily="50" charset="-128"/>
-              </a:rPr>
-              <a:t>サブネット </a:t>
-            </a:r>
-            <a:r>
-              <a:rPr lang="en-US" altLang="ja-JP" sz="1000" b="1" dirty="0" smtClean="0">
-                <a:solidFill>
-                  <a:srgbClr val="002060"/>
-                </a:solidFill>
-                <a:latin typeface="Meiryo UI" pitchFamily="50" charset="-128"/>
-                <a:ea typeface="Meiryo UI" pitchFamily="50" charset="-128"/>
-                <a:cs typeface="Meiryo UI" pitchFamily="50" charset="-128"/>
-              </a:rPr>
-              <a:t>3</a:t>
-            </a:r>
-            <a:endParaRPr kumimoji="1" lang="en-US" altLang="ja-JP" sz="1000" b="1" dirty="0" smtClean="0">
-              <a:solidFill>
-                <a:srgbClr val="002060"/>
-              </a:solidFill>
-              <a:latin typeface="Meiryo UI" pitchFamily="50" charset="-128"/>
-              <a:ea typeface="Meiryo UI" pitchFamily="50" charset="-128"/>
-              <a:cs typeface="Meiryo UI" pitchFamily="50" charset="-128"/>
-            </a:endParaRPr>
-          </a:p>
-          <a:p>
-            <a:pPr algn="ctr"/>
-            <a:r>
-              <a:rPr kumimoji="1" lang="en-US" altLang="ja-JP" sz="1000" b="1" dirty="0" smtClean="0">
-                <a:solidFill>
-                  <a:srgbClr val="002060"/>
-                </a:solidFill>
-                <a:latin typeface="Meiryo UI" pitchFamily="50" charset="-128"/>
-                <a:ea typeface="Meiryo UI" pitchFamily="50" charset="-128"/>
-                <a:cs typeface="Meiryo UI" pitchFamily="50" charset="-128"/>
-              </a:rPr>
-              <a:t>(172.24.37.0/24)</a:t>
-            </a:r>
-            <a:endParaRPr kumimoji="1" lang="ja-JP" altLang="en-US" sz="1000" b="1" dirty="0">
-              <a:solidFill>
-                <a:srgbClr val="002060"/>
-              </a:solidFill>
-              <a:latin typeface="Meiryo UI" pitchFamily="50" charset="-128"/>
-              <a:ea typeface="Meiryo UI" pitchFamily="50" charset="-128"/>
-              <a:cs typeface="Meiryo UI" pitchFamily="50" charset="-128"/>
-            </a:endParaRPr>
-          </a:p>
-        </p:txBody>
-      </p:sp>
-      <p:sp>
-        <p:nvSpPr>
-          <p:cNvPr id="133" name="角丸四角形 132"/>
-          <p:cNvSpPr/>
-          <p:nvPr/>
-        </p:nvSpPr>
-        <p:spPr>
-          <a:xfrm>
-            <a:off x="1331640" y="980728"/>
-            <a:ext cx="1512168" cy="432048"/>
-          </a:xfrm>
-          <a:prstGeom prst="roundRect">
-            <a:avLst/>
-          </a:prstGeom>
-        </p:spPr>
-        <p:style>
-          <a:lnRef idx="2">
-            <a:schemeClr val="accent3"/>
-          </a:lnRef>
-          <a:fillRef idx="1">
-            <a:schemeClr val="lt1"/>
-          </a:fillRef>
-          <a:effectRef idx="0">
-            <a:schemeClr val="accent3"/>
-          </a:effectRef>
-          <a:fontRef idx="minor">
-            <a:schemeClr val="dk1"/>
-          </a:fontRef>
-        </p:style>
-        <p:txBody>
-          <a:bodyPr rtlCol="0" anchor="ctr"/>
-          <a:lstStyle/>
-          <a:p>
-            <a:pPr algn="ctr"/>
-            <a:r>
-              <a:rPr kumimoji="1" lang="ja-JP" altLang="en-US" sz="1000" b="1" dirty="0" smtClean="0">
-                <a:solidFill>
-                  <a:srgbClr val="002060"/>
-                </a:solidFill>
-                <a:latin typeface="Meiryo UI" pitchFamily="50" charset="-128"/>
-                <a:ea typeface="Meiryo UI" pitchFamily="50" charset="-128"/>
-                <a:cs typeface="Meiryo UI" pitchFamily="50" charset="-128"/>
-              </a:rPr>
-              <a:t>サブネット </a:t>
-            </a:r>
-            <a:r>
-              <a:rPr kumimoji="1" lang="en-US" altLang="ja-JP" sz="1000" b="1" dirty="0" smtClean="0">
-                <a:solidFill>
-                  <a:srgbClr val="002060"/>
-                </a:solidFill>
-                <a:latin typeface="Meiryo UI" pitchFamily="50" charset="-128"/>
-                <a:ea typeface="Meiryo UI" pitchFamily="50" charset="-128"/>
-                <a:cs typeface="Meiryo UI" pitchFamily="50" charset="-128"/>
-              </a:rPr>
-              <a:t>1</a:t>
-            </a:r>
-          </a:p>
-          <a:p>
-            <a:pPr algn="ctr"/>
-            <a:r>
-              <a:rPr kumimoji="1" lang="en-US" altLang="ja-JP" sz="1000" b="1" dirty="0" smtClean="0">
-                <a:solidFill>
-                  <a:srgbClr val="002060"/>
-                </a:solidFill>
-                <a:latin typeface="Meiryo UI" pitchFamily="50" charset="-128"/>
-                <a:ea typeface="Meiryo UI" pitchFamily="50" charset="-128"/>
-                <a:cs typeface="Meiryo UI" pitchFamily="50" charset="-128"/>
-              </a:rPr>
-              <a:t>(172.24.17.0/24)</a:t>
-            </a:r>
-            <a:endParaRPr kumimoji="1" lang="ja-JP" altLang="en-US" sz="1000" b="1" dirty="0">
-              <a:solidFill>
-                <a:srgbClr val="002060"/>
-              </a:solidFill>
-              <a:latin typeface="Meiryo UI" pitchFamily="50" charset="-128"/>
-              <a:ea typeface="Meiryo UI" pitchFamily="50" charset="-128"/>
-              <a:cs typeface="Meiryo UI" pitchFamily="50" charset="-128"/>
-            </a:endParaRPr>
-          </a:p>
-        </p:txBody>
-      </p:sp>
-      <p:sp>
-        <p:nvSpPr>
           <p:cNvPr id="146" name="正方形/長方形 145"/>
           <p:cNvSpPr/>
           <p:nvPr/>
         </p:nvSpPr>
         <p:spPr>
           <a:xfrm>
-            <a:off x="3364120" y="6348316"/>
+            <a:off x="3704114" y="6348316"/>
             <a:ext cx="1495912" cy="360040"/>
           </a:xfrm>
           <a:prstGeom prst="rect">
@@ -4506,7 +4247,7 @@
         </p:nvSpPr>
         <p:spPr>
           <a:xfrm>
-            <a:off x="4013138" y="5965416"/>
+            <a:off x="4353132" y="5965416"/>
             <a:ext cx="198822" cy="216024"/>
           </a:xfrm>
           <a:prstGeom prst="rect">
@@ -4556,7 +4297,7 @@
         </p:nvCxnSpPr>
         <p:spPr>
           <a:xfrm flipV="1">
-            <a:off x="4112076" y="6181440"/>
+            <a:off x="4452070" y="6181440"/>
             <a:ext cx="473" cy="166876"/>
           </a:xfrm>
           <a:prstGeom prst="straightConnector1">
@@ -4591,7 +4332,7 @@
         </p:nvSpPr>
         <p:spPr>
           <a:xfrm>
-            <a:off x="4228216" y="4980164"/>
+            <a:off x="4568210" y="4980164"/>
             <a:ext cx="1495912" cy="360040"/>
           </a:xfrm>
           <a:prstGeom prst="rect">
@@ -4661,7 +4402,7 @@
         </p:nvSpPr>
         <p:spPr>
           <a:xfrm>
-            <a:off x="4877234" y="4597264"/>
+            <a:off x="5217228" y="4597264"/>
             <a:ext cx="198822" cy="216024"/>
           </a:xfrm>
           <a:prstGeom prst="rect">
@@ -4711,7 +4452,7 @@
         </p:nvCxnSpPr>
         <p:spPr>
           <a:xfrm flipV="1">
-            <a:off x="4976172" y="4813288"/>
+            <a:off x="5316166" y="4813288"/>
             <a:ext cx="473" cy="166876"/>
           </a:xfrm>
           <a:prstGeom prst="straightConnector1">
@@ -4746,7 +4487,7 @@
         </p:nvSpPr>
         <p:spPr>
           <a:xfrm>
-            <a:off x="4877234" y="5484220"/>
+            <a:off x="5217228" y="5484220"/>
             <a:ext cx="198822" cy="216024"/>
           </a:xfrm>
           <a:prstGeom prst="rect">
@@ -4796,7 +4537,7 @@
         </p:nvCxnSpPr>
         <p:spPr>
           <a:xfrm flipH="1" flipV="1">
-            <a:off x="4976172" y="5340204"/>
+            <a:off x="5316166" y="5340204"/>
             <a:ext cx="473" cy="144016"/>
           </a:xfrm>
           <a:prstGeom prst="straightConnector1">
@@ -4831,7 +4572,7 @@
         </p:nvSpPr>
         <p:spPr>
           <a:xfrm>
-            <a:off x="2627784" y="4980164"/>
+            <a:off x="2967778" y="4980164"/>
             <a:ext cx="1495912" cy="360040"/>
           </a:xfrm>
           <a:prstGeom prst="rect">
@@ -4901,7 +4642,7 @@
         </p:nvSpPr>
         <p:spPr>
           <a:xfrm>
-            <a:off x="3276802" y="4597264"/>
+            <a:off x="3616796" y="4597264"/>
             <a:ext cx="198822" cy="216024"/>
           </a:xfrm>
           <a:prstGeom prst="rect">
@@ -4951,7 +4692,7 @@
         </p:nvCxnSpPr>
         <p:spPr>
           <a:xfrm flipV="1">
-            <a:off x="3375740" y="4813288"/>
+            <a:off x="3715734" y="4813288"/>
             <a:ext cx="473" cy="166876"/>
           </a:xfrm>
           <a:prstGeom prst="straightConnector1">
@@ -4986,7 +4727,7 @@
         </p:nvSpPr>
         <p:spPr>
           <a:xfrm>
-            <a:off x="3276802" y="5484220"/>
+            <a:off x="3616796" y="5484220"/>
             <a:ext cx="198822" cy="216024"/>
           </a:xfrm>
           <a:prstGeom prst="rect">
@@ -5036,7 +4777,7 @@
         </p:nvCxnSpPr>
         <p:spPr>
           <a:xfrm flipH="1" flipV="1">
-            <a:off x="3375740" y="5340204"/>
+            <a:off x="3715734" y="5340204"/>
             <a:ext cx="473" cy="144016"/>
           </a:xfrm>
           <a:prstGeom prst="straightConnector1">
@@ -5071,7 +4812,7 @@
         </p:nvSpPr>
         <p:spPr>
           <a:xfrm>
-            <a:off x="4228216" y="3612012"/>
+            <a:off x="4568210" y="3612012"/>
             <a:ext cx="1495912" cy="360040"/>
           </a:xfrm>
           <a:prstGeom prst="rect">
@@ -5141,7 +4882,7 @@
         </p:nvSpPr>
         <p:spPr>
           <a:xfrm>
-            <a:off x="4877234" y="3229112"/>
+            <a:off x="5217228" y="3229112"/>
             <a:ext cx="198822" cy="216024"/>
           </a:xfrm>
           <a:prstGeom prst="rect">
@@ -5191,7 +4932,7 @@
         </p:nvCxnSpPr>
         <p:spPr>
           <a:xfrm flipV="1">
-            <a:off x="4976172" y="3445136"/>
+            <a:off x="5316166" y="3445136"/>
             <a:ext cx="473" cy="166876"/>
           </a:xfrm>
           <a:prstGeom prst="straightConnector1">
@@ -5226,7 +4967,7 @@
         </p:nvSpPr>
         <p:spPr>
           <a:xfrm>
-            <a:off x="4877234" y="4116068"/>
+            <a:off x="5217228" y="4116068"/>
             <a:ext cx="198822" cy="216024"/>
           </a:xfrm>
           <a:prstGeom prst="rect">
@@ -5276,7 +5017,7 @@
         </p:nvCxnSpPr>
         <p:spPr>
           <a:xfrm flipH="1" flipV="1">
-            <a:off x="4976172" y="3972052"/>
+            <a:off x="5316166" y="3972052"/>
             <a:ext cx="473" cy="144016"/>
           </a:xfrm>
           <a:prstGeom prst="straightConnector1">
@@ -5311,7 +5052,7 @@
         </p:nvSpPr>
         <p:spPr>
           <a:xfrm>
-            <a:off x="2627784" y="3612012"/>
+            <a:off x="2967778" y="3612012"/>
             <a:ext cx="1495912" cy="360040"/>
           </a:xfrm>
           <a:prstGeom prst="rect">
@@ -5381,7 +5122,7 @@
         </p:nvSpPr>
         <p:spPr>
           <a:xfrm>
-            <a:off x="3276802" y="3229112"/>
+            <a:off x="3616796" y="3229112"/>
             <a:ext cx="198822" cy="216024"/>
           </a:xfrm>
           <a:prstGeom prst="rect">
@@ -5431,7 +5172,7 @@
         </p:nvCxnSpPr>
         <p:spPr>
           <a:xfrm flipV="1">
-            <a:off x="3375740" y="3445136"/>
+            <a:off x="3715734" y="3445136"/>
             <a:ext cx="473" cy="166876"/>
           </a:xfrm>
           <a:prstGeom prst="straightConnector1">
@@ -5466,7 +5207,7 @@
         </p:nvSpPr>
         <p:spPr>
           <a:xfrm>
-            <a:off x="3276802" y="4116068"/>
+            <a:off x="3616796" y="4116068"/>
             <a:ext cx="198822" cy="216024"/>
           </a:xfrm>
           <a:prstGeom prst="rect">
@@ -5516,7 +5257,7 @@
         </p:nvCxnSpPr>
         <p:spPr>
           <a:xfrm flipH="1" flipV="1">
-            <a:off x="3375740" y="3972052"/>
+            <a:off x="3715734" y="3972052"/>
             <a:ext cx="473" cy="144016"/>
           </a:xfrm>
           <a:prstGeom prst="straightConnector1">
@@ -5551,7 +5292,7 @@
         </p:nvSpPr>
         <p:spPr>
           <a:xfrm>
-            <a:off x="1763688" y="6250020"/>
+            <a:off x="2103682" y="6250020"/>
             <a:ext cx="1206206" cy="563356"/>
           </a:xfrm>
           <a:prstGeom prst="can">
@@ -5606,7 +5347,7 @@
         </p:nvCxnSpPr>
         <p:spPr>
           <a:xfrm flipV="1">
-            <a:off x="2969894" y="6528336"/>
+            <a:off x="3309888" y="6528336"/>
             <a:ext cx="394226" cy="3362"/>
           </a:xfrm>
           <a:prstGeom prst="straightConnector1">
@@ -5641,7 +5382,7 @@
         </p:nvSpPr>
         <p:spPr>
           <a:xfrm>
-            <a:off x="4211960" y="2348880"/>
+            <a:off x="4551954" y="2348880"/>
             <a:ext cx="2311851" cy="276999"/>
           </a:xfrm>
           <a:prstGeom prst="rect">
@@ -5685,7 +5426,7 @@
         </p:nvSpPr>
         <p:spPr>
           <a:xfrm>
-            <a:off x="2627784" y="620688"/>
+            <a:off x="2967778" y="620688"/>
             <a:ext cx="1260648" cy="432048"/>
           </a:xfrm>
           <a:prstGeom prst="roundRect">
@@ -5758,7 +5499,7 @@
         </p:nvCxnSpPr>
         <p:spPr>
           <a:xfrm>
-            <a:off x="5544616" y="836712"/>
+            <a:off x="5884610" y="836712"/>
             <a:ext cx="179512" cy="2955320"/>
           </a:xfrm>
           <a:prstGeom prst="bentConnector3">
@@ -5801,7 +5542,7 @@
         </p:nvCxnSpPr>
         <p:spPr>
           <a:xfrm rot="10800000" flipV="1">
-            <a:off x="2627784" y="836712"/>
+            <a:off x="2967778" y="836712"/>
             <a:ext cx="12700" cy="2955320"/>
           </a:xfrm>
           <a:prstGeom prst="bentConnector3">
@@ -5841,7 +5582,7 @@
         </p:nvSpPr>
         <p:spPr>
           <a:xfrm>
-            <a:off x="4932040" y="6389844"/>
+            <a:off x="5272034" y="6389844"/>
             <a:ext cx="1532214" cy="276999"/>
           </a:xfrm>
           <a:prstGeom prst="rect">
@@ -5885,7 +5626,7 @@
         </p:nvSpPr>
         <p:spPr>
           <a:xfrm>
-            <a:off x="2051720" y="6192473"/>
+            <a:off x="2391714" y="6192473"/>
             <a:ext cx="623889" cy="276999"/>
           </a:xfrm>
           <a:prstGeom prst="rect">
@@ -5929,7 +5670,7 @@
         </p:nvSpPr>
         <p:spPr>
           <a:xfrm>
-            <a:off x="5780896" y="5018264"/>
+            <a:off x="6120890" y="5018264"/>
             <a:ext cx="1532214" cy="276999"/>
           </a:xfrm>
           <a:prstGeom prst="rect">
@@ -5973,7 +5714,7 @@
         </p:nvSpPr>
         <p:spPr>
           <a:xfrm>
-            <a:off x="5796136" y="3900044"/>
+            <a:off x="6136130" y="3900044"/>
             <a:ext cx="1532214" cy="276999"/>
           </a:xfrm>
           <a:prstGeom prst="rect">
@@ -5999,6 +5740,342 @@
               <a:t>1vCPU,2GB MEM</a:t>
             </a:r>
             <a:endParaRPr kumimoji="1" lang="en-US" altLang="ja-JP" sz="1200" b="1" dirty="0" smtClean="0">
+              <a:solidFill>
+                <a:srgbClr val="002060"/>
+              </a:solidFill>
+              <a:latin typeface="Meiryo UI" pitchFamily="50" charset="-128"/>
+              <a:ea typeface="Meiryo UI" pitchFamily="50" charset="-128"/>
+              <a:cs typeface="Meiryo UI" pitchFamily="50" charset="-128"/>
+            </a:endParaRPr>
+          </a:p>
+        </p:txBody>
+      </p:sp>
+      <p:sp>
+        <p:nvSpPr>
+          <p:cNvPr id="107" name="角丸四角形 106"/>
+          <p:cNvSpPr/>
+          <p:nvPr/>
+        </p:nvSpPr>
+        <p:spPr>
+          <a:xfrm>
+            <a:off x="879546" y="2747916"/>
+            <a:ext cx="2304256" cy="432048"/>
+          </a:xfrm>
+          <a:prstGeom prst="roundRect">
+            <a:avLst/>
+          </a:prstGeom>
+        </p:spPr>
+        <p:style>
+          <a:lnRef idx="2">
+            <a:schemeClr val="accent3"/>
+          </a:lnRef>
+          <a:fillRef idx="1">
+            <a:schemeClr val="lt1"/>
+          </a:fillRef>
+          <a:effectRef idx="0">
+            <a:schemeClr val="accent3"/>
+          </a:effectRef>
+          <a:fontRef idx="minor">
+            <a:schemeClr val="dk1"/>
+          </a:fontRef>
+        </p:style>
+        <p:txBody>
+          <a:bodyPr rtlCol="0" anchor="ctr"/>
+          <a:lstStyle/>
+          <a:p>
+            <a:pPr algn="ctr"/>
+            <a:r>
+              <a:rPr kumimoji="1" lang="ja-JP" altLang="en-US" sz="1000" b="1" dirty="0" smtClean="0">
+                <a:solidFill>
+                  <a:srgbClr val="002060"/>
+                </a:solidFill>
+                <a:latin typeface="Meiryo UI" pitchFamily="50" charset="-128"/>
+                <a:ea typeface="Meiryo UI" pitchFamily="50" charset="-128"/>
+                <a:cs typeface="Meiryo UI" pitchFamily="50" charset="-128"/>
+              </a:rPr>
+              <a:t>サブネット </a:t>
+            </a:r>
+            <a:r>
+              <a:rPr kumimoji="1" lang="en-US" altLang="ja-JP" sz="1000" b="1" dirty="0" smtClean="0">
+                <a:solidFill>
+                  <a:srgbClr val="002060"/>
+                </a:solidFill>
+                <a:latin typeface="Meiryo UI" pitchFamily="50" charset="-128"/>
+                <a:ea typeface="Meiryo UI" pitchFamily="50" charset="-128"/>
+                <a:cs typeface="Meiryo UI" pitchFamily="50" charset="-128"/>
+              </a:rPr>
+              <a:t>1</a:t>
+            </a:r>
+          </a:p>
+          <a:p>
+            <a:pPr algn="ctr"/>
+            <a:r>
+              <a:rPr kumimoji="1" lang="en-US" altLang="ja-JP" sz="1000" b="1" dirty="0" smtClean="0">
+                <a:solidFill>
+                  <a:srgbClr val="002060"/>
+                </a:solidFill>
+                <a:latin typeface="Meiryo UI" pitchFamily="50" charset="-128"/>
+                <a:ea typeface="Meiryo UI" pitchFamily="50" charset="-128"/>
+                <a:cs typeface="Meiryo UI" pitchFamily="50" charset="-128"/>
+              </a:rPr>
+              <a:t>(</a:t>
+            </a:r>
+            <a:r>
+              <a:rPr kumimoji="1" lang="en-US" altLang="ja-JP" sz="1000" b="1" dirty="0" smtClean="0">
+                <a:solidFill>
+                  <a:srgbClr val="002060"/>
+                </a:solidFill>
+                <a:latin typeface="Meiryo UI" pitchFamily="50" charset="-128"/>
+                <a:ea typeface="Meiryo UI" pitchFamily="50" charset="-128"/>
+                <a:cs typeface="Meiryo UI" pitchFamily="50" charset="-128"/>
+              </a:rPr>
+              <a:t>172.24.17.10</a:t>
+            </a:r>
+            <a:r>
+              <a:rPr kumimoji="1" lang="ja-JP" altLang="en-US" sz="1000" b="1" dirty="0" smtClean="0">
+                <a:solidFill>
+                  <a:srgbClr val="002060"/>
+                </a:solidFill>
+                <a:latin typeface="Meiryo UI" pitchFamily="50" charset="-128"/>
+                <a:ea typeface="Meiryo UI" pitchFamily="50" charset="-128"/>
+                <a:cs typeface="Meiryo UI" pitchFamily="50" charset="-128"/>
+              </a:rPr>
+              <a:t>～</a:t>
+            </a:r>
+            <a:r>
+              <a:rPr kumimoji="1" lang="en-US" altLang="ja-JP" sz="1000" b="1" dirty="0" smtClean="0">
+                <a:solidFill>
+                  <a:srgbClr val="002060"/>
+                </a:solidFill>
+                <a:latin typeface="Meiryo UI" pitchFamily="50" charset="-128"/>
+                <a:ea typeface="Meiryo UI" pitchFamily="50" charset="-128"/>
+                <a:cs typeface="Meiryo UI" pitchFamily="50" charset="-128"/>
+              </a:rPr>
+              <a:t>100/24) </a:t>
+            </a:r>
+            <a:endParaRPr kumimoji="1" lang="ja-JP" altLang="en-US" sz="1000" b="1" dirty="0">
+              <a:solidFill>
+                <a:srgbClr val="002060"/>
+              </a:solidFill>
+              <a:latin typeface="Meiryo UI" pitchFamily="50" charset="-128"/>
+              <a:ea typeface="Meiryo UI" pitchFamily="50" charset="-128"/>
+              <a:cs typeface="Meiryo UI" pitchFamily="50" charset="-128"/>
+            </a:endParaRPr>
+          </a:p>
+        </p:txBody>
+      </p:sp>
+      <p:sp>
+        <p:nvSpPr>
+          <p:cNvPr id="108" name="角丸四角形 107"/>
+          <p:cNvSpPr/>
+          <p:nvPr/>
+        </p:nvSpPr>
+        <p:spPr>
+          <a:xfrm>
+            <a:off x="879546" y="4116068"/>
+            <a:ext cx="2304256" cy="432048"/>
+          </a:xfrm>
+          <a:prstGeom prst="roundRect">
+            <a:avLst/>
+          </a:prstGeom>
+        </p:spPr>
+        <p:style>
+          <a:lnRef idx="2">
+            <a:schemeClr val="accent3"/>
+          </a:lnRef>
+          <a:fillRef idx="1">
+            <a:schemeClr val="lt1"/>
+          </a:fillRef>
+          <a:effectRef idx="0">
+            <a:schemeClr val="accent3"/>
+          </a:effectRef>
+          <a:fontRef idx="minor">
+            <a:schemeClr val="dk1"/>
+          </a:fontRef>
+        </p:style>
+        <p:txBody>
+          <a:bodyPr rtlCol="0" anchor="ctr"/>
+          <a:lstStyle/>
+          <a:p>
+            <a:pPr algn="ctr"/>
+            <a:r>
+              <a:rPr kumimoji="1" lang="ja-JP" altLang="en-US" sz="1000" b="1" dirty="0" smtClean="0">
+                <a:solidFill>
+                  <a:srgbClr val="002060"/>
+                </a:solidFill>
+                <a:latin typeface="Meiryo UI" pitchFamily="50" charset="-128"/>
+                <a:ea typeface="Meiryo UI" pitchFamily="50" charset="-128"/>
+                <a:cs typeface="Meiryo UI" pitchFamily="50" charset="-128"/>
+              </a:rPr>
+              <a:t>サブネット </a:t>
+            </a:r>
+            <a:r>
+              <a:rPr lang="en-US" altLang="ja-JP" sz="1000" b="1" dirty="0" smtClean="0">
+                <a:solidFill>
+                  <a:srgbClr val="002060"/>
+                </a:solidFill>
+                <a:latin typeface="Meiryo UI" pitchFamily="50" charset="-128"/>
+                <a:ea typeface="Meiryo UI" pitchFamily="50" charset="-128"/>
+                <a:cs typeface="Meiryo UI" pitchFamily="50" charset="-128"/>
+              </a:rPr>
+              <a:t>2</a:t>
+            </a:r>
+            <a:endParaRPr kumimoji="1" lang="en-US" altLang="ja-JP" sz="1000" b="1" dirty="0" smtClean="0">
+              <a:solidFill>
+                <a:srgbClr val="002060"/>
+              </a:solidFill>
+              <a:latin typeface="Meiryo UI" pitchFamily="50" charset="-128"/>
+              <a:ea typeface="Meiryo UI" pitchFamily="50" charset="-128"/>
+              <a:cs typeface="Meiryo UI" pitchFamily="50" charset="-128"/>
+            </a:endParaRPr>
+          </a:p>
+          <a:p>
+            <a:pPr algn="ctr"/>
+            <a:r>
+              <a:rPr kumimoji="1" lang="en-US" altLang="ja-JP" sz="1000" b="1" dirty="0" smtClean="0">
+                <a:solidFill>
+                  <a:srgbClr val="002060"/>
+                </a:solidFill>
+                <a:latin typeface="Meiryo UI" pitchFamily="50" charset="-128"/>
+                <a:ea typeface="Meiryo UI" pitchFamily="50" charset="-128"/>
+                <a:cs typeface="Meiryo UI" pitchFamily="50" charset="-128"/>
+              </a:rPr>
+              <a:t>(</a:t>
+            </a:r>
+            <a:r>
+              <a:rPr kumimoji="1" lang="en-US" altLang="ja-JP" sz="1000" b="1" dirty="0" smtClean="0">
+                <a:solidFill>
+                  <a:srgbClr val="002060"/>
+                </a:solidFill>
+                <a:latin typeface="Meiryo UI" pitchFamily="50" charset="-128"/>
+                <a:ea typeface="Meiryo UI" pitchFamily="50" charset="-128"/>
+                <a:cs typeface="Meiryo UI" pitchFamily="50" charset="-128"/>
+              </a:rPr>
+              <a:t>172.24.27.100</a:t>
+            </a:r>
+            <a:r>
+              <a:rPr kumimoji="1" lang="ja-JP" altLang="en-US" sz="1000" b="1" dirty="0" smtClean="0">
+                <a:solidFill>
+                  <a:srgbClr val="002060"/>
+                </a:solidFill>
+                <a:latin typeface="Meiryo UI" pitchFamily="50" charset="-128"/>
+                <a:ea typeface="Meiryo UI" pitchFamily="50" charset="-128"/>
+                <a:cs typeface="Meiryo UI" pitchFamily="50" charset="-128"/>
+              </a:rPr>
+              <a:t>～</a:t>
+            </a:r>
+            <a:r>
+              <a:rPr kumimoji="1" lang="en-US" altLang="ja-JP" sz="1000" b="1" dirty="0" smtClean="0">
+                <a:solidFill>
+                  <a:srgbClr val="002060"/>
+                </a:solidFill>
+                <a:latin typeface="Meiryo UI" pitchFamily="50" charset="-128"/>
+                <a:ea typeface="Meiryo UI" pitchFamily="50" charset="-128"/>
+                <a:cs typeface="Meiryo UI" pitchFamily="50" charset="-128"/>
+              </a:rPr>
+              <a:t>200/24</a:t>
+            </a:r>
+            <a:r>
+              <a:rPr kumimoji="1" lang="en-US" altLang="ja-JP" sz="1000" b="1" dirty="0" smtClean="0">
+                <a:solidFill>
+                  <a:srgbClr val="002060"/>
+                </a:solidFill>
+                <a:latin typeface="Meiryo UI" pitchFamily="50" charset="-128"/>
+                <a:ea typeface="Meiryo UI" pitchFamily="50" charset="-128"/>
+                <a:cs typeface="Meiryo UI" pitchFamily="50" charset="-128"/>
+              </a:rPr>
+              <a:t>)</a:t>
+            </a:r>
+            <a:endParaRPr kumimoji="1" lang="ja-JP" altLang="en-US" sz="1000" b="1" dirty="0">
+              <a:solidFill>
+                <a:srgbClr val="002060"/>
+              </a:solidFill>
+              <a:latin typeface="Meiryo UI" pitchFamily="50" charset="-128"/>
+              <a:ea typeface="Meiryo UI" pitchFamily="50" charset="-128"/>
+              <a:cs typeface="Meiryo UI" pitchFamily="50" charset="-128"/>
+            </a:endParaRPr>
+          </a:p>
+        </p:txBody>
+      </p:sp>
+      <p:sp>
+        <p:nvSpPr>
+          <p:cNvPr id="109" name="角丸四角形 108"/>
+          <p:cNvSpPr/>
+          <p:nvPr/>
+        </p:nvSpPr>
+        <p:spPr>
+          <a:xfrm>
+            <a:off x="879546" y="5389352"/>
+            <a:ext cx="2304256" cy="432048"/>
+          </a:xfrm>
+          <a:prstGeom prst="roundRect">
+            <a:avLst/>
+          </a:prstGeom>
+        </p:spPr>
+        <p:style>
+          <a:lnRef idx="2">
+            <a:schemeClr val="accent3"/>
+          </a:lnRef>
+          <a:fillRef idx="1">
+            <a:schemeClr val="lt1"/>
+          </a:fillRef>
+          <a:effectRef idx="0">
+            <a:schemeClr val="accent3"/>
+          </a:effectRef>
+          <a:fontRef idx="minor">
+            <a:schemeClr val="dk1"/>
+          </a:fontRef>
+        </p:style>
+        <p:txBody>
+          <a:bodyPr rtlCol="0" anchor="ctr"/>
+          <a:lstStyle/>
+          <a:p>
+            <a:pPr algn="ctr"/>
+            <a:r>
+              <a:rPr kumimoji="1" lang="ja-JP" altLang="en-US" sz="1000" b="1" dirty="0" smtClean="0">
+                <a:solidFill>
+                  <a:srgbClr val="002060"/>
+                </a:solidFill>
+                <a:latin typeface="Meiryo UI" pitchFamily="50" charset="-128"/>
+                <a:ea typeface="Meiryo UI" pitchFamily="50" charset="-128"/>
+                <a:cs typeface="Meiryo UI" pitchFamily="50" charset="-128"/>
+              </a:rPr>
+              <a:t>サブネット </a:t>
+            </a:r>
+            <a:r>
+              <a:rPr lang="en-US" altLang="ja-JP" sz="1000" b="1" dirty="0" smtClean="0">
+                <a:solidFill>
+                  <a:srgbClr val="002060"/>
+                </a:solidFill>
+                <a:latin typeface="Meiryo UI" pitchFamily="50" charset="-128"/>
+                <a:ea typeface="Meiryo UI" pitchFamily="50" charset="-128"/>
+                <a:cs typeface="Meiryo UI" pitchFamily="50" charset="-128"/>
+              </a:rPr>
+              <a:t>3</a:t>
+            </a:r>
+            <a:endParaRPr kumimoji="1" lang="en-US" altLang="ja-JP" sz="1000" b="1" dirty="0" smtClean="0">
+              <a:solidFill>
+                <a:srgbClr val="002060"/>
+              </a:solidFill>
+              <a:latin typeface="Meiryo UI" pitchFamily="50" charset="-128"/>
+              <a:ea typeface="Meiryo UI" pitchFamily="50" charset="-128"/>
+              <a:cs typeface="Meiryo UI" pitchFamily="50" charset="-128"/>
+            </a:endParaRPr>
+          </a:p>
+          <a:p>
+            <a:pPr algn="ctr"/>
+            <a:r>
+              <a:rPr kumimoji="1" lang="en-US" altLang="ja-JP" sz="1000" b="1" dirty="0" smtClean="0">
+                <a:solidFill>
+                  <a:srgbClr val="002060"/>
+                </a:solidFill>
+                <a:latin typeface="Meiryo UI" pitchFamily="50" charset="-128"/>
+                <a:ea typeface="Meiryo UI" pitchFamily="50" charset="-128"/>
+                <a:cs typeface="Meiryo UI" pitchFamily="50" charset="-128"/>
+              </a:rPr>
+              <a:t>(172.24.37.0/24)</a:t>
+            </a:r>
+            <a:endParaRPr kumimoji="1" lang="ja-JP" altLang="en-US" sz="1000" b="1" dirty="0">
               <a:solidFill>
                 <a:srgbClr val="002060"/>
               </a:solidFill>

</xml_diff>

<commit_message>
add nova boot images
</commit_message>
<xml_diff>
--- a/pict/2-3-0-a.pptx
+++ b/pict/2-3-0-a.pptx
@@ -3832,7 +3832,7 @@
         <p:spPr>
           <a:xfrm>
             <a:off x="4623962" y="620688"/>
-            <a:ext cx="1260648" cy="432048"/>
+            <a:ext cx="1388198" cy="432048"/>
           </a:xfrm>
           <a:prstGeom prst="roundRect">
             <a:avLst/>
@@ -3880,7 +3880,7 @@
                 <a:ea typeface="Meiryo UI" pitchFamily="50" charset="-128"/>
                 <a:cs typeface="Meiryo UI" pitchFamily="50" charset="-128"/>
               </a:rPr>
-              <a:t>10.100.100.5</a:t>
+              <a:t>192.168.100.203</a:t>
             </a:r>
             <a:endParaRPr lang="ja-JP" altLang="en-US" sz="1000" b="1" dirty="0">
               <a:solidFill>
@@ -4090,87 +4090,6 @@
       </p:sp>
       <p:sp>
         <p:nvSpPr>
-          <p:cNvPr id="133" name="角丸四角形 132"/>
-          <p:cNvSpPr/>
-          <p:nvPr/>
-        </p:nvSpPr>
-        <p:spPr>
-          <a:xfrm>
-            <a:off x="1671634" y="980728"/>
-            <a:ext cx="1512168" cy="432048"/>
-          </a:xfrm>
-          <a:prstGeom prst="roundRect">
-            <a:avLst/>
-          </a:prstGeom>
-        </p:spPr>
-        <p:style>
-          <a:lnRef idx="2">
-            <a:schemeClr val="accent3"/>
-          </a:lnRef>
-          <a:fillRef idx="1">
-            <a:schemeClr val="lt1"/>
-          </a:fillRef>
-          <a:effectRef idx="0">
-            <a:schemeClr val="accent3"/>
-          </a:effectRef>
-          <a:fontRef idx="minor">
-            <a:schemeClr val="dk1"/>
-          </a:fontRef>
-        </p:style>
-        <p:txBody>
-          <a:bodyPr rtlCol="0" anchor="ctr"/>
-          <a:lstStyle/>
-          <a:p>
-            <a:pPr algn="ctr"/>
-            <a:r>
-              <a:rPr kumimoji="1" lang="ja-JP" altLang="en-US" sz="1000" b="1" dirty="0" smtClean="0">
-                <a:solidFill>
-                  <a:srgbClr val="002060"/>
-                </a:solidFill>
-                <a:latin typeface="Meiryo UI" pitchFamily="50" charset="-128"/>
-                <a:ea typeface="Meiryo UI" pitchFamily="50" charset="-128"/>
-                <a:cs typeface="Meiryo UI" pitchFamily="50" charset="-128"/>
-              </a:rPr>
-              <a:t>サブネット </a:t>
-            </a:r>
-            <a:r>
-              <a:rPr kumimoji="1" lang="en-US" altLang="ja-JP" sz="1000" b="1" dirty="0" smtClean="0">
-                <a:solidFill>
-                  <a:srgbClr val="002060"/>
-                </a:solidFill>
-                <a:latin typeface="Meiryo UI" pitchFamily="50" charset="-128"/>
-                <a:ea typeface="Meiryo UI" pitchFamily="50" charset="-128"/>
-                <a:cs typeface="Meiryo UI" pitchFamily="50" charset="-128"/>
-              </a:rPr>
-              <a:t>1</a:t>
-            </a:r>
-          </a:p>
-          <a:p>
-            <a:pPr algn="ctr"/>
-            <a:r>
-              <a:rPr kumimoji="1" lang="en-US" altLang="ja-JP" sz="1000" b="1" dirty="0" smtClean="0">
-                <a:solidFill>
-                  <a:srgbClr val="002060"/>
-                </a:solidFill>
-                <a:latin typeface="Meiryo UI" pitchFamily="50" charset="-128"/>
-                <a:ea typeface="Meiryo UI" pitchFamily="50" charset="-128"/>
-                <a:cs typeface="Meiryo UI" pitchFamily="50" charset="-128"/>
-              </a:rPr>
-              <a:t>(172.24.17.0/24)</a:t>
-            </a:r>
-            <a:endParaRPr kumimoji="1" lang="ja-JP" altLang="en-US" sz="1000" b="1" dirty="0">
-              <a:solidFill>
-                <a:srgbClr val="002060"/>
-              </a:solidFill>
-              <a:latin typeface="Meiryo UI" pitchFamily="50" charset="-128"/>
-              <a:ea typeface="Meiryo UI" pitchFamily="50" charset="-128"/>
-              <a:cs typeface="Meiryo UI" pitchFamily="50" charset="-128"/>
-            </a:endParaRPr>
-          </a:p>
-        </p:txBody>
-      </p:sp>
-      <p:sp>
-        <p:nvSpPr>
           <p:cNvPr id="146" name="正方形/長方形 145"/>
           <p:cNvSpPr/>
           <p:nvPr/>
@@ -5376,58 +5295,14 @@
       </p:cxnSp>
       <p:sp>
         <p:nvSpPr>
-          <p:cNvPr id="186" name="テキスト ボックス 185"/>
-          <p:cNvSpPr txBox="1"/>
-          <p:nvPr/>
-        </p:nvSpPr>
-        <p:spPr>
-          <a:xfrm>
-            <a:off x="4551954" y="2348880"/>
-            <a:ext cx="2311851" cy="276999"/>
-          </a:xfrm>
-          <a:prstGeom prst="rect">
-            <a:avLst/>
-          </a:prstGeom>
-          <a:noFill/>
-        </p:spPr>
-        <p:txBody>
-          <a:bodyPr wrap="none" rtlCol="0">
-            <a:spAutoFit/>
-          </a:bodyPr>
-          <a:lstStyle/>
-          <a:p>
-            <a:r>
-              <a:rPr lang="en-US" altLang="ja-JP" sz="1200" b="1" dirty="0" smtClean="0">
-                <a:solidFill>
-                  <a:srgbClr val="002060"/>
-                </a:solidFill>
-                <a:latin typeface="Meiryo UI" pitchFamily="50" charset="-128"/>
-                <a:ea typeface="Meiryo UI" pitchFamily="50" charset="-128"/>
-                <a:cs typeface="Meiryo UI" pitchFamily="50" charset="-128"/>
-              </a:rPr>
-              <a:t>default gw:172.24.17.254</a:t>
-            </a:r>
-            <a:endParaRPr kumimoji="1" lang="en-US" altLang="ja-JP" sz="1200" b="1" dirty="0" smtClean="0">
-              <a:solidFill>
-                <a:srgbClr val="002060"/>
-              </a:solidFill>
-              <a:latin typeface="Meiryo UI" pitchFamily="50" charset="-128"/>
-              <a:ea typeface="Meiryo UI" pitchFamily="50" charset="-128"/>
-              <a:cs typeface="Meiryo UI" pitchFamily="50" charset="-128"/>
-            </a:endParaRPr>
-          </a:p>
-        </p:txBody>
-      </p:sp>
-      <p:sp>
-        <p:nvSpPr>
           <p:cNvPr id="188" name="角丸四角形 187"/>
           <p:cNvSpPr/>
           <p:nvPr/>
         </p:nvSpPr>
         <p:spPr>
           <a:xfrm>
-            <a:off x="2967778" y="620688"/>
-            <a:ext cx="1260648" cy="432048"/>
+            <a:off x="2895770" y="620688"/>
+            <a:ext cx="1388198" cy="432048"/>
           </a:xfrm>
           <a:prstGeom prst="roundRect">
             <a:avLst/>
@@ -5475,7 +5350,7 @@
                 <a:ea typeface="Meiryo UI" pitchFamily="50" charset="-128"/>
                 <a:cs typeface="Meiryo UI" pitchFamily="50" charset="-128"/>
               </a:rPr>
-              <a:t>10.100.100.5</a:t>
+              <a:t>192.168.100.201</a:t>
             </a:r>
             <a:endParaRPr lang="ja-JP" altLang="en-US" sz="1000" b="1" dirty="0">
               <a:solidFill>
@@ -5499,12 +5374,12 @@
         </p:nvCxnSpPr>
         <p:spPr>
           <a:xfrm>
-            <a:off x="5884610" y="836712"/>
-            <a:ext cx="179512" cy="2955320"/>
+            <a:off x="6012160" y="836712"/>
+            <a:ext cx="51962" cy="2955320"/>
           </a:xfrm>
           <a:prstGeom prst="bentConnector3">
             <a:avLst>
-              <a:gd name="adj1" fmla="val 631854"/>
+              <a:gd name="adj1" fmla="val 2161665"/>
             </a:avLst>
           </a:prstGeom>
           <a:ln w="57150">
@@ -5541,13 +5416,13 @@
           <p:nvPr/>
         </p:nvCxnSpPr>
         <p:spPr>
-          <a:xfrm rot="10800000" flipV="1">
-            <a:off x="2967778" y="836712"/>
-            <a:ext cx="12700" cy="2955320"/>
+          <a:xfrm rot="10800000" flipH="1" flipV="1">
+            <a:off x="2895770" y="836712"/>
+            <a:ext cx="72008" cy="2955320"/>
           </a:xfrm>
           <a:prstGeom prst="bentConnector3">
             <a:avLst>
-              <a:gd name="adj1" fmla="val 11470594"/>
+              <a:gd name="adj1" fmla="val -3031478"/>
             </a:avLst>
           </a:prstGeom>
           <a:ln w="57150">
@@ -5818,7 +5693,29 @@
                 <a:ea typeface="Meiryo UI" pitchFamily="50" charset="-128"/>
                 <a:cs typeface="Meiryo UI" pitchFamily="50" charset="-128"/>
               </a:rPr>
-              <a:t>(</a:t>
+              <a:t>(172.24.17.10</a:t>
+            </a:r>
+            <a:r>
+              <a:rPr kumimoji="1" lang="ja-JP" altLang="en-US" sz="1000" b="1" dirty="0" smtClean="0">
+                <a:solidFill>
+                  <a:srgbClr val="002060"/>
+                </a:solidFill>
+                <a:latin typeface="Meiryo UI" pitchFamily="50" charset="-128"/>
+                <a:ea typeface="Meiryo UI" pitchFamily="50" charset="-128"/>
+                <a:cs typeface="Meiryo UI" pitchFamily="50" charset="-128"/>
+              </a:rPr>
+              <a:t>～</a:t>
+            </a:r>
+            <a:r>
+              <a:rPr lang="en-US" altLang="ja-JP" sz="1000" b="1" dirty="0" smtClean="0">
+                <a:solidFill>
+                  <a:srgbClr val="002060"/>
+                </a:solidFill>
+                <a:latin typeface="Meiryo UI" pitchFamily="50" charset="-128"/>
+                <a:ea typeface="Meiryo UI" pitchFamily="50" charset="-128"/>
+                <a:cs typeface="Meiryo UI" pitchFamily="50" charset="-128"/>
+              </a:rPr>
+              <a:t>249</a:t>
             </a:r>
             <a:r>
               <a:rPr kumimoji="1" lang="en-US" altLang="ja-JP" sz="1000" b="1" dirty="0" smtClean="0">
@@ -5829,29 +5726,7 @@
                 <a:ea typeface="Meiryo UI" pitchFamily="50" charset="-128"/>
                 <a:cs typeface="Meiryo UI" pitchFamily="50" charset="-128"/>
               </a:rPr>
-              <a:t>172.24.17.10</a:t>
-            </a:r>
-            <a:r>
-              <a:rPr kumimoji="1" lang="ja-JP" altLang="en-US" sz="1000" b="1" dirty="0" smtClean="0">
-                <a:solidFill>
-                  <a:srgbClr val="002060"/>
-                </a:solidFill>
-                <a:latin typeface="Meiryo UI" pitchFamily="50" charset="-128"/>
-                <a:ea typeface="Meiryo UI" pitchFamily="50" charset="-128"/>
-                <a:cs typeface="Meiryo UI" pitchFamily="50" charset="-128"/>
-              </a:rPr>
-              <a:t>～</a:t>
-            </a:r>
-            <a:r>
-              <a:rPr kumimoji="1" lang="en-US" altLang="ja-JP" sz="1000" b="1" dirty="0" smtClean="0">
-                <a:solidFill>
-                  <a:srgbClr val="002060"/>
-                </a:solidFill>
-                <a:latin typeface="Meiryo UI" pitchFamily="50" charset="-128"/>
-                <a:ea typeface="Meiryo UI" pitchFamily="50" charset="-128"/>
-                <a:cs typeface="Meiryo UI" pitchFamily="50" charset="-128"/>
-              </a:rPr>
-              <a:t>100/24) </a:t>
+              <a:t>/24) </a:t>
             </a:r>
             <a:endParaRPr kumimoji="1" lang="ja-JP" altLang="en-US" sz="1000" b="1" dirty="0">
               <a:solidFill>
@@ -5940,51 +5815,7 @@
                 <a:ea typeface="Meiryo UI" pitchFamily="50" charset="-128"/>
                 <a:cs typeface="Meiryo UI" pitchFamily="50" charset="-128"/>
               </a:rPr>
-              <a:t>(</a:t>
-            </a:r>
-            <a:r>
-              <a:rPr kumimoji="1" lang="en-US" altLang="ja-JP" sz="1000" b="1" dirty="0" smtClean="0">
-                <a:solidFill>
-                  <a:srgbClr val="002060"/>
-                </a:solidFill>
-                <a:latin typeface="Meiryo UI" pitchFamily="50" charset="-128"/>
-                <a:ea typeface="Meiryo UI" pitchFamily="50" charset="-128"/>
-                <a:cs typeface="Meiryo UI" pitchFamily="50" charset="-128"/>
-              </a:rPr>
-              <a:t>172.24.27.100</a:t>
-            </a:r>
-            <a:r>
-              <a:rPr kumimoji="1" lang="ja-JP" altLang="en-US" sz="1000" b="1" dirty="0" smtClean="0">
-                <a:solidFill>
-                  <a:srgbClr val="002060"/>
-                </a:solidFill>
-                <a:latin typeface="Meiryo UI" pitchFamily="50" charset="-128"/>
-                <a:ea typeface="Meiryo UI" pitchFamily="50" charset="-128"/>
-                <a:cs typeface="Meiryo UI" pitchFamily="50" charset="-128"/>
-              </a:rPr>
-              <a:t>～</a:t>
-            </a:r>
-            <a:r>
-              <a:rPr kumimoji="1" lang="en-US" altLang="ja-JP" sz="1000" b="1" dirty="0" smtClean="0">
-                <a:solidFill>
-                  <a:srgbClr val="002060"/>
-                </a:solidFill>
-                <a:latin typeface="Meiryo UI" pitchFamily="50" charset="-128"/>
-                <a:ea typeface="Meiryo UI" pitchFamily="50" charset="-128"/>
-                <a:cs typeface="Meiryo UI" pitchFamily="50" charset="-128"/>
-              </a:rPr>
-              <a:t>200/24</a:t>
-            </a:r>
-            <a:r>
-              <a:rPr kumimoji="1" lang="en-US" altLang="ja-JP" sz="1000" b="1" dirty="0" smtClean="0">
-                <a:solidFill>
-                  <a:srgbClr val="002060"/>
-                </a:solidFill>
-                <a:latin typeface="Meiryo UI" pitchFamily="50" charset="-128"/>
-                <a:ea typeface="Meiryo UI" pitchFamily="50" charset="-128"/>
-                <a:cs typeface="Meiryo UI" pitchFamily="50" charset="-128"/>
-              </a:rPr>
-              <a:t>)</a:t>
+              <a:t>(172.24.27.0/24)</a:t>
             </a:r>
             <a:endParaRPr kumimoji="1" lang="ja-JP" altLang="en-US" sz="1000" b="1" dirty="0">
               <a:solidFill>
@@ -6074,6 +5905,246 @@
                 <a:cs typeface="Meiryo UI" pitchFamily="50" charset="-128"/>
               </a:rPr>
               <a:t>(172.24.37.0/24)</a:t>
+            </a:r>
+            <a:endParaRPr kumimoji="1" lang="ja-JP" altLang="en-US" sz="1000" b="1" dirty="0">
+              <a:solidFill>
+                <a:srgbClr val="002060"/>
+              </a:solidFill>
+              <a:latin typeface="Meiryo UI" pitchFamily="50" charset="-128"/>
+              <a:ea typeface="Meiryo UI" pitchFamily="50" charset="-128"/>
+              <a:cs typeface="Meiryo UI" pitchFamily="50" charset="-128"/>
+            </a:endParaRPr>
+          </a:p>
+        </p:txBody>
+      </p:sp>
+      <p:sp>
+        <p:nvSpPr>
+          <p:cNvPr id="55" name="角丸四角形 54"/>
+          <p:cNvSpPr/>
+          <p:nvPr/>
+        </p:nvSpPr>
+        <p:spPr>
+          <a:xfrm>
+            <a:off x="4860032" y="2276872"/>
+            <a:ext cx="1440160" cy="360040"/>
+          </a:xfrm>
+          <a:prstGeom prst="roundRect">
+            <a:avLst/>
+          </a:prstGeom>
+        </p:spPr>
+        <p:style>
+          <a:lnRef idx="2">
+            <a:schemeClr val="accent2"/>
+          </a:lnRef>
+          <a:fillRef idx="1">
+            <a:schemeClr val="lt1"/>
+          </a:fillRef>
+          <a:effectRef idx="0">
+            <a:schemeClr val="accent2"/>
+          </a:effectRef>
+          <a:fontRef idx="minor">
+            <a:schemeClr val="dk1"/>
+          </a:fontRef>
+        </p:style>
+        <p:txBody>
+          <a:bodyPr rtlCol="0" anchor="ctr"/>
+          <a:lstStyle/>
+          <a:p>
+            <a:pPr algn="ctr"/>
+            <a:r>
+              <a:rPr lang="en-US" altLang="ja-JP" sz="1000" b="1" dirty="0" smtClean="0">
+                <a:solidFill>
+                  <a:srgbClr val="002060"/>
+                </a:solidFill>
+                <a:latin typeface="Meiryo UI" pitchFamily="50" charset="-128"/>
+                <a:ea typeface="Meiryo UI" pitchFamily="50" charset="-128"/>
+                <a:cs typeface="Meiryo UI" pitchFamily="50" charset="-128"/>
+              </a:rPr>
+              <a:t>default gateway</a:t>
+            </a:r>
+          </a:p>
+          <a:p>
+            <a:pPr algn="ctr"/>
+            <a:r>
+              <a:rPr lang="en-US" altLang="ja-JP" sz="1000" b="1" dirty="0" smtClean="0">
+                <a:solidFill>
+                  <a:srgbClr val="002060"/>
+                </a:solidFill>
+                <a:latin typeface="Meiryo UI" pitchFamily="50" charset="-128"/>
+                <a:ea typeface="Meiryo UI" pitchFamily="50" charset="-128"/>
+                <a:cs typeface="Meiryo UI" pitchFamily="50" charset="-128"/>
+              </a:rPr>
+              <a:t>172.24.17.254</a:t>
+            </a:r>
+            <a:endParaRPr lang="ja-JP" altLang="en-US" sz="1000" b="1" dirty="0">
+              <a:solidFill>
+                <a:srgbClr val="002060"/>
+              </a:solidFill>
+              <a:latin typeface="Meiryo UI" pitchFamily="50" charset="-128"/>
+              <a:ea typeface="Meiryo UI" pitchFamily="50" charset="-128"/>
+              <a:cs typeface="Meiryo UI" pitchFamily="50" charset="-128"/>
+            </a:endParaRPr>
+          </a:p>
+        </p:txBody>
+      </p:sp>
+      <p:sp>
+        <p:nvSpPr>
+          <p:cNvPr id="56" name="角丸四角形 55"/>
+          <p:cNvSpPr/>
+          <p:nvPr/>
+        </p:nvSpPr>
+        <p:spPr>
+          <a:xfrm>
+            <a:off x="5598330" y="3374922"/>
+            <a:ext cx="1368152" cy="197806"/>
+          </a:xfrm>
+          <a:prstGeom prst="roundRect">
+            <a:avLst/>
+          </a:prstGeom>
+        </p:spPr>
+        <p:style>
+          <a:lnRef idx="2">
+            <a:schemeClr val="accent2"/>
+          </a:lnRef>
+          <a:fillRef idx="1">
+            <a:schemeClr val="lt1"/>
+          </a:fillRef>
+          <a:effectRef idx="0">
+            <a:schemeClr val="accent2"/>
+          </a:effectRef>
+          <a:fontRef idx="minor">
+            <a:schemeClr val="dk1"/>
+          </a:fontRef>
+        </p:style>
+        <p:txBody>
+          <a:bodyPr rtlCol="0" anchor="ctr"/>
+          <a:lstStyle/>
+          <a:p>
+            <a:pPr algn="ctr"/>
+            <a:r>
+              <a:rPr lang="en-US" altLang="ja-JP" sz="1000" b="1" dirty="0" err="1" smtClean="0">
+                <a:solidFill>
+                  <a:srgbClr val="002060"/>
+                </a:solidFill>
+                <a:latin typeface="Meiryo UI" pitchFamily="50" charset="-128"/>
+                <a:ea typeface="Meiryo UI" pitchFamily="50" charset="-128"/>
+                <a:cs typeface="Meiryo UI" pitchFamily="50" charset="-128"/>
+              </a:rPr>
+              <a:t>allow:http</a:t>
+            </a:r>
+            <a:r>
+              <a:rPr lang="en-US" altLang="ja-JP" sz="1000" b="1" dirty="0" smtClean="0">
+                <a:solidFill>
+                  <a:srgbClr val="002060"/>
+                </a:solidFill>
+                <a:latin typeface="Meiryo UI" pitchFamily="50" charset="-128"/>
+                <a:ea typeface="Meiryo UI" pitchFamily="50" charset="-128"/>
+                <a:cs typeface="Meiryo UI" pitchFamily="50" charset="-128"/>
+              </a:rPr>
+              <a:t>/https</a:t>
+            </a:r>
+            <a:endParaRPr lang="ja-JP" altLang="en-US" sz="1000" b="1" dirty="0">
+              <a:solidFill>
+                <a:srgbClr val="002060"/>
+              </a:solidFill>
+              <a:latin typeface="Meiryo UI" pitchFamily="50" charset="-128"/>
+              <a:ea typeface="Meiryo UI" pitchFamily="50" charset="-128"/>
+              <a:cs typeface="Meiryo UI" pitchFamily="50" charset="-128"/>
+            </a:endParaRPr>
+          </a:p>
+        </p:txBody>
+      </p:sp>
+      <p:sp>
+        <p:nvSpPr>
+          <p:cNvPr id="133" name="角丸四角形 132"/>
+          <p:cNvSpPr/>
+          <p:nvPr/>
+        </p:nvSpPr>
+        <p:spPr>
+          <a:xfrm>
+            <a:off x="1259632" y="1052736"/>
+            <a:ext cx="1708146" cy="432048"/>
+          </a:xfrm>
+          <a:prstGeom prst="roundRect">
+            <a:avLst/>
+          </a:prstGeom>
+        </p:spPr>
+        <p:style>
+          <a:lnRef idx="2">
+            <a:schemeClr val="accent3"/>
+          </a:lnRef>
+          <a:fillRef idx="1">
+            <a:schemeClr val="lt1"/>
+          </a:fillRef>
+          <a:effectRef idx="0">
+            <a:schemeClr val="accent3"/>
+          </a:effectRef>
+          <a:fontRef idx="minor">
+            <a:schemeClr val="dk1"/>
+          </a:fontRef>
+        </p:style>
+        <p:txBody>
+          <a:bodyPr rtlCol="0" anchor="ctr"/>
+          <a:lstStyle/>
+          <a:p>
+            <a:pPr algn="ctr"/>
+            <a:r>
+              <a:rPr kumimoji="1" lang="ja-JP" altLang="en-US" sz="1000" b="1" dirty="0" smtClean="0">
+                <a:solidFill>
+                  <a:srgbClr val="002060"/>
+                </a:solidFill>
+                <a:latin typeface="Meiryo UI" pitchFamily="50" charset="-128"/>
+                <a:ea typeface="Meiryo UI" pitchFamily="50" charset="-128"/>
+                <a:cs typeface="Meiryo UI" pitchFamily="50" charset="-128"/>
+              </a:rPr>
+              <a:t>サブネット </a:t>
+            </a:r>
+            <a:r>
+              <a:rPr kumimoji="1" lang="en-US" altLang="ja-JP" sz="1000" b="1" dirty="0" smtClean="0">
+                <a:solidFill>
+                  <a:srgbClr val="002060"/>
+                </a:solidFill>
+                <a:latin typeface="Meiryo UI" pitchFamily="50" charset="-128"/>
+                <a:ea typeface="Meiryo UI" pitchFamily="50" charset="-128"/>
+                <a:cs typeface="Meiryo UI" pitchFamily="50" charset="-128"/>
+              </a:rPr>
+              <a:t>1</a:t>
+            </a:r>
+          </a:p>
+          <a:p>
+            <a:pPr algn="ctr"/>
+            <a:r>
+              <a:rPr kumimoji="1" lang="en-US" altLang="ja-JP" sz="1000" b="1" dirty="0" smtClean="0">
+                <a:solidFill>
+                  <a:srgbClr val="002060"/>
+                </a:solidFill>
+                <a:latin typeface="Meiryo UI" pitchFamily="50" charset="-128"/>
+                <a:ea typeface="Meiryo UI" pitchFamily="50" charset="-128"/>
+                <a:cs typeface="Meiryo UI" pitchFamily="50" charset="-128"/>
+              </a:rPr>
+              <a:t>(</a:t>
+            </a:r>
+            <a:r>
+              <a:rPr kumimoji="1" lang="en-US" altLang="ja-JP" sz="1000" b="1" dirty="0" smtClean="0">
+                <a:solidFill>
+                  <a:srgbClr val="002060"/>
+                </a:solidFill>
+                <a:latin typeface="Meiryo UI" pitchFamily="50" charset="-128"/>
+                <a:ea typeface="Meiryo UI" pitchFamily="50" charset="-128"/>
+                <a:cs typeface="Meiryo UI" pitchFamily="50" charset="-128"/>
+              </a:rPr>
+              <a:t>192.168.100.0/24</a:t>
+            </a:r>
+            <a:r>
+              <a:rPr kumimoji="1" lang="en-US" altLang="ja-JP" sz="1000" b="1" dirty="0" smtClean="0">
+                <a:solidFill>
+                  <a:srgbClr val="002060"/>
+                </a:solidFill>
+                <a:latin typeface="Meiryo UI" pitchFamily="50" charset="-128"/>
+                <a:ea typeface="Meiryo UI" pitchFamily="50" charset="-128"/>
+                <a:cs typeface="Meiryo UI" pitchFamily="50" charset="-128"/>
+              </a:rPr>
+              <a:t>)</a:t>
             </a:r>
             <a:endParaRPr kumimoji="1" lang="ja-JP" altLang="en-US" sz="1000" b="1" dirty="0">
               <a:solidFill>

</xml_diff>